<commit_message>
changes related to the double ended queue and circular queue : VP
</commit_message>
<xml_diff>
--- a/Data Structures using C#/data-structures-using-.net-core-csharp/Queue/Queue/Queue.pptx
+++ b/Data Structures using C#/data-structures-using-.net-core-csharp/Queue/Queue/Queue.pptx
@@ -203,7 +203,7 @@
           <a:p>
             <a:fld id="{2FB6FFA2-5596-DA47-A26B-229D3D705C9C}" type="datetimeFigureOut">
               <a:rPr lang="en-US" smtClean="0"/>
-              <a:t>1/12/22</a:t>
+              <a:t>5/24/22</a:t>
             </a:fld>
             <a:endParaRPr lang="en-US"/>
           </a:p>
@@ -1205,7 +1205,7 @@
           <a:p>
             <a:fld id="{D7AFABE5-C7E3-F145-818B-F1C9F2CF8384}" type="datetimeFigureOut">
               <a:rPr lang="en-US" smtClean="0"/>
-              <a:t>1/12/22</a:t>
+              <a:t>5/24/22</a:t>
             </a:fld>
             <a:endParaRPr lang="en-US"/>
           </a:p>
@@ -1403,7 +1403,7 @@
           <a:p>
             <a:fld id="{D7AFABE5-C7E3-F145-818B-F1C9F2CF8384}" type="datetimeFigureOut">
               <a:rPr lang="en-US" smtClean="0"/>
-              <a:t>1/12/22</a:t>
+              <a:t>5/24/22</a:t>
             </a:fld>
             <a:endParaRPr lang="en-US"/>
           </a:p>
@@ -1611,7 +1611,7 @@
           <a:p>
             <a:fld id="{D7AFABE5-C7E3-F145-818B-F1C9F2CF8384}" type="datetimeFigureOut">
               <a:rPr lang="en-US" smtClean="0"/>
-              <a:t>1/12/22</a:t>
+              <a:t>5/24/22</a:t>
             </a:fld>
             <a:endParaRPr lang="en-US"/>
           </a:p>
@@ -1809,7 +1809,7 @@
           <a:p>
             <a:fld id="{D7AFABE5-C7E3-F145-818B-F1C9F2CF8384}" type="datetimeFigureOut">
               <a:rPr lang="en-US" smtClean="0"/>
-              <a:t>1/12/22</a:t>
+              <a:t>5/24/22</a:t>
             </a:fld>
             <a:endParaRPr lang="en-US"/>
           </a:p>
@@ -2084,7 +2084,7 @@
           <a:p>
             <a:fld id="{D7AFABE5-C7E3-F145-818B-F1C9F2CF8384}" type="datetimeFigureOut">
               <a:rPr lang="en-US" smtClean="0"/>
-              <a:t>1/12/22</a:t>
+              <a:t>5/24/22</a:t>
             </a:fld>
             <a:endParaRPr lang="en-US"/>
           </a:p>
@@ -2349,7 +2349,7 @@
           <a:p>
             <a:fld id="{D7AFABE5-C7E3-F145-818B-F1C9F2CF8384}" type="datetimeFigureOut">
               <a:rPr lang="en-US" smtClean="0"/>
-              <a:t>1/12/22</a:t>
+              <a:t>5/24/22</a:t>
             </a:fld>
             <a:endParaRPr lang="en-US"/>
           </a:p>
@@ -2761,7 +2761,7 @@
           <a:p>
             <a:fld id="{D7AFABE5-C7E3-F145-818B-F1C9F2CF8384}" type="datetimeFigureOut">
               <a:rPr lang="en-US" smtClean="0"/>
-              <a:t>1/12/22</a:t>
+              <a:t>5/24/22</a:t>
             </a:fld>
             <a:endParaRPr lang="en-US"/>
           </a:p>
@@ -2902,7 +2902,7 @@
           <a:p>
             <a:fld id="{D7AFABE5-C7E3-F145-818B-F1C9F2CF8384}" type="datetimeFigureOut">
               <a:rPr lang="en-US" smtClean="0"/>
-              <a:t>1/12/22</a:t>
+              <a:t>5/24/22</a:t>
             </a:fld>
             <a:endParaRPr lang="en-US"/>
           </a:p>
@@ -3015,7 +3015,7 @@
           <a:p>
             <a:fld id="{D7AFABE5-C7E3-F145-818B-F1C9F2CF8384}" type="datetimeFigureOut">
               <a:rPr lang="en-US" smtClean="0"/>
-              <a:t>1/12/22</a:t>
+              <a:t>5/24/22</a:t>
             </a:fld>
             <a:endParaRPr lang="en-US"/>
           </a:p>
@@ -3326,7 +3326,7 @@
           <a:p>
             <a:fld id="{D7AFABE5-C7E3-F145-818B-F1C9F2CF8384}" type="datetimeFigureOut">
               <a:rPr lang="en-US" smtClean="0"/>
-              <a:t>1/12/22</a:t>
+              <a:t>5/24/22</a:t>
             </a:fld>
             <a:endParaRPr lang="en-US"/>
           </a:p>
@@ -3614,7 +3614,7 @@
           <a:p>
             <a:fld id="{D7AFABE5-C7E3-F145-818B-F1C9F2CF8384}" type="datetimeFigureOut">
               <a:rPr lang="en-US" smtClean="0"/>
-              <a:t>1/12/22</a:t>
+              <a:t>5/24/22</a:t>
             </a:fld>
             <a:endParaRPr lang="en-US"/>
           </a:p>
@@ -3855,7 +3855,7 @@
           <a:p>
             <a:fld id="{D7AFABE5-C7E3-F145-818B-F1C9F2CF8384}" type="datetimeFigureOut">
               <a:rPr lang="en-US" smtClean="0"/>
-              <a:t>1/12/22</a:t>
+              <a:t>5/24/22</a:t>
             </a:fld>
             <a:endParaRPr lang="en-US"/>
           </a:p>
@@ -4454,7 +4454,7 @@
         <p:spPr>
           <a:xfrm>
             <a:off x="276262" y="1536174"/>
-            <a:ext cx="4684619" cy="4093428"/>
+            <a:ext cx="4684619" cy="4708981"/>
           </a:xfrm>
           <a:prstGeom prst="rect">
             <a:avLst/>
@@ -4533,6 +4533,20 @@
                 </a:solidFill>
               </a:rPr>
               <a:t> are pointers, “front” always points first element in the queue, “rear” always points last element.</a:t>
+            </a:r>
+          </a:p>
+          <a:p>
+            <a:pPr marL="285750" indent="-285750" fontAlgn="base">
+              <a:buFont typeface="Arial" panose="020B0604020202020204" pitchFamily="34" charset="0"/>
+              <a:buChar char="•"/>
+            </a:pPr>
+            <a:r>
+              <a:rPr lang="en-US" dirty="0">
+                <a:solidFill>
+                  <a:schemeClr val="tx1"/>
+                </a:solidFill>
+              </a:rPr>
+              <a:t>Insert elements using front and delete element using rear.</a:t>
             </a:r>
           </a:p>
           <a:p>
@@ -5420,7 +5434,7 @@
                   <a:schemeClr val="tx1"/>
                 </a:solidFill>
               </a:rPr>
-              <a:t>Check queue is full or not rear == max -1</a:t>
+              <a:t>Check queue is full or not (rear == max -1)</a:t>
             </a:r>
           </a:p>
           <a:p>
@@ -16001,6 +16015,523 @@
                 </a:solidFill>
               </a:rPr>
               <a:t>: 10, 30, 40, 20 </a:t>
+            </a:r>
+          </a:p>
+        </p:txBody>
+      </p:sp>
+      <p:graphicFrame>
+        <p:nvGraphicFramePr>
+          <p:cNvPr id="10" name="Table 3">
+            <a:extLst>
+              <a:ext uri="{FF2B5EF4-FFF2-40B4-BE49-F238E27FC236}">
+                <a16:creationId xmlns:a16="http://schemas.microsoft.com/office/drawing/2014/main" id="{A329E4CB-A2B2-F250-3C53-BF2F39B270CA}"/>
+              </a:ext>
+            </a:extLst>
+          </p:cNvPr>
+          <p:cNvGraphicFramePr>
+            <a:graphicFrameLocks noGrp="1"/>
+          </p:cNvGraphicFramePr>
+          <p:nvPr>
+            <p:extLst>
+              <p:ext uri="{D42A27DB-BD31-4B8C-83A1-F6EECF244321}">
+                <p14:modId xmlns:p14="http://schemas.microsoft.com/office/powerpoint/2010/main" val="1391288274"/>
+              </p:ext>
+            </p:extLst>
+          </p:nvPr>
+        </p:nvGraphicFramePr>
+        <p:xfrm>
+          <a:off x="6417317" y="4400468"/>
+          <a:ext cx="4684620" cy="700466"/>
+        </p:xfrm>
+        <a:graphic>
+          <a:graphicData uri="http://schemas.openxmlformats.org/drawingml/2006/table">
+            <a:tbl>
+              <a:tblPr>
+                <a:tableStyleId>{5C22544A-7EE6-4342-B048-85BDC9FD1C3A}</a:tableStyleId>
+              </a:tblPr>
+              <a:tblGrid>
+                <a:gridCol w="936924">
+                  <a:extLst>
+                    <a:ext uri="{9D8B030D-6E8A-4147-A177-3AD203B41FA5}">
+                      <a16:colId xmlns:a16="http://schemas.microsoft.com/office/drawing/2014/main" val="2139398421"/>
+                    </a:ext>
+                  </a:extLst>
+                </a:gridCol>
+                <a:gridCol w="936924">
+                  <a:extLst>
+                    <a:ext uri="{9D8B030D-6E8A-4147-A177-3AD203B41FA5}">
+                      <a16:colId xmlns:a16="http://schemas.microsoft.com/office/drawing/2014/main" val="877457157"/>
+                    </a:ext>
+                  </a:extLst>
+                </a:gridCol>
+                <a:gridCol w="936924">
+                  <a:extLst>
+                    <a:ext uri="{9D8B030D-6E8A-4147-A177-3AD203B41FA5}">
+                      <a16:colId xmlns:a16="http://schemas.microsoft.com/office/drawing/2014/main" val="3401421321"/>
+                    </a:ext>
+                  </a:extLst>
+                </a:gridCol>
+                <a:gridCol w="936924">
+                  <a:extLst>
+                    <a:ext uri="{9D8B030D-6E8A-4147-A177-3AD203B41FA5}">
+                      <a16:colId xmlns:a16="http://schemas.microsoft.com/office/drawing/2014/main" val="2922032310"/>
+                    </a:ext>
+                  </a:extLst>
+                </a:gridCol>
+                <a:gridCol w="936924">
+                  <a:extLst>
+                    <a:ext uri="{9D8B030D-6E8A-4147-A177-3AD203B41FA5}">
+                      <a16:colId xmlns:a16="http://schemas.microsoft.com/office/drawing/2014/main" val="4150386259"/>
+                    </a:ext>
+                  </a:extLst>
+                </a:gridCol>
+              </a:tblGrid>
+              <a:tr h="700466">
+                <a:tc>
+                  <a:txBody>
+                    <a:bodyPr/>
+                    <a:lstStyle/>
+                    <a:p>
+                      <a:pPr algn="ctr"/>
+                      <a:endParaRPr lang="en-US" dirty="0"/>
+                    </a:p>
+                  </a:txBody>
+                  <a:tcPr marL="0" marR="0" marT="0" marB="0" anchor="ctr" anchorCtr="1">
+                    <a:lnL w="76200" cap="flat" cmpd="sng" algn="ctr">
+                      <a:solidFill>
+                        <a:schemeClr val="bg1"/>
+                      </a:solidFill>
+                      <a:prstDash val="solid"/>
+                      <a:round/>
+                      <a:headEnd type="none" w="med" len="med"/>
+                      <a:tailEnd type="none" w="med" len="med"/>
+                    </a:lnL>
+                    <a:lnR w="76200" cap="flat" cmpd="sng" algn="ctr">
+                      <a:solidFill>
+                        <a:schemeClr val="bg1"/>
+                      </a:solidFill>
+                      <a:prstDash val="solid"/>
+                      <a:round/>
+                      <a:headEnd type="none" w="med" len="med"/>
+                      <a:tailEnd type="none" w="med" len="med"/>
+                    </a:lnR>
+                    <a:lnT w="76200" cap="flat" cmpd="sng" algn="ctr">
+                      <a:solidFill>
+                        <a:schemeClr val="bg1"/>
+                      </a:solidFill>
+                      <a:prstDash val="solid"/>
+                      <a:round/>
+                      <a:headEnd type="none" w="med" len="med"/>
+                      <a:tailEnd type="none" w="med" len="med"/>
+                    </a:lnT>
+                    <a:lnB w="76200" cap="flat" cmpd="sng" algn="ctr">
+                      <a:solidFill>
+                        <a:schemeClr val="bg1"/>
+                      </a:solidFill>
+                      <a:prstDash val="solid"/>
+                      <a:round/>
+                      <a:headEnd type="none" w="med" len="med"/>
+                      <a:tailEnd type="none" w="med" len="med"/>
+                    </a:lnB>
+                    <a:noFill/>
+                  </a:tcPr>
+                </a:tc>
+                <a:tc>
+                  <a:txBody>
+                    <a:bodyPr/>
+                    <a:lstStyle/>
+                    <a:p>
+                      <a:pPr algn="ctr"/>
+                      <a:r>
+                        <a:rPr lang="en-US" dirty="0"/>
+                        <a:t>30</a:t>
+                      </a:r>
+                    </a:p>
+                  </a:txBody>
+                  <a:tcPr marL="0" marR="0" marT="0" marB="0" anchor="ctr" anchorCtr="1">
+                    <a:lnL w="76200" cap="flat" cmpd="sng" algn="ctr">
+                      <a:solidFill>
+                        <a:schemeClr val="bg1"/>
+                      </a:solidFill>
+                      <a:prstDash val="solid"/>
+                      <a:round/>
+                      <a:headEnd type="none" w="med" len="med"/>
+                      <a:tailEnd type="none" w="med" len="med"/>
+                    </a:lnL>
+                    <a:lnR w="76200" cap="flat" cmpd="sng" algn="ctr">
+                      <a:solidFill>
+                        <a:schemeClr val="bg1"/>
+                      </a:solidFill>
+                      <a:prstDash val="solid"/>
+                      <a:round/>
+                      <a:headEnd type="none" w="med" len="med"/>
+                      <a:tailEnd type="none" w="med" len="med"/>
+                    </a:lnR>
+                    <a:lnT w="76200" cap="flat" cmpd="sng" algn="ctr">
+                      <a:solidFill>
+                        <a:schemeClr val="bg1"/>
+                      </a:solidFill>
+                      <a:prstDash val="solid"/>
+                      <a:round/>
+                      <a:headEnd type="none" w="med" len="med"/>
+                      <a:tailEnd type="none" w="med" len="med"/>
+                    </a:lnT>
+                    <a:lnB w="76200" cap="flat" cmpd="sng" algn="ctr">
+                      <a:solidFill>
+                        <a:schemeClr val="bg1"/>
+                      </a:solidFill>
+                      <a:prstDash val="solid"/>
+                      <a:round/>
+                      <a:headEnd type="none" w="med" len="med"/>
+                      <a:tailEnd type="none" w="med" len="med"/>
+                    </a:lnB>
+                    <a:noFill/>
+                  </a:tcPr>
+                </a:tc>
+                <a:tc>
+                  <a:txBody>
+                    <a:bodyPr/>
+                    <a:lstStyle/>
+                    <a:p>
+                      <a:pPr algn="ctr"/>
+                      <a:r>
+                        <a:rPr lang="en-US" dirty="0"/>
+                        <a:t>40</a:t>
+                      </a:r>
+                    </a:p>
+                  </a:txBody>
+                  <a:tcPr marL="0" marR="0" marT="0" marB="0" anchor="ctr" anchorCtr="1">
+                    <a:lnL w="76200" cap="flat" cmpd="sng" algn="ctr">
+                      <a:solidFill>
+                        <a:schemeClr val="bg1"/>
+                      </a:solidFill>
+                      <a:prstDash val="solid"/>
+                      <a:round/>
+                      <a:headEnd type="none" w="med" len="med"/>
+                      <a:tailEnd type="none" w="med" len="med"/>
+                    </a:lnL>
+                    <a:lnR w="76200" cap="flat" cmpd="sng" algn="ctr">
+                      <a:solidFill>
+                        <a:schemeClr val="bg1"/>
+                      </a:solidFill>
+                      <a:prstDash val="solid"/>
+                      <a:round/>
+                      <a:headEnd type="none" w="med" len="med"/>
+                      <a:tailEnd type="none" w="med" len="med"/>
+                    </a:lnR>
+                    <a:lnT w="76200" cap="flat" cmpd="sng" algn="ctr">
+                      <a:solidFill>
+                        <a:schemeClr val="bg1"/>
+                      </a:solidFill>
+                      <a:prstDash val="solid"/>
+                      <a:round/>
+                      <a:headEnd type="none" w="med" len="med"/>
+                      <a:tailEnd type="none" w="med" len="med"/>
+                    </a:lnT>
+                    <a:lnB w="76200" cap="flat" cmpd="sng" algn="ctr">
+                      <a:solidFill>
+                        <a:schemeClr val="bg1"/>
+                      </a:solidFill>
+                      <a:prstDash val="solid"/>
+                      <a:round/>
+                      <a:headEnd type="none" w="med" len="med"/>
+                      <a:tailEnd type="none" w="med" len="med"/>
+                    </a:lnB>
+                    <a:noFill/>
+                  </a:tcPr>
+                </a:tc>
+                <a:tc>
+                  <a:txBody>
+                    <a:bodyPr/>
+                    <a:lstStyle/>
+                    <a:p>
+                      <a:pPr algn="ctr"/>
+                      <a:r>
+                        <a:rPr lang="en-US" dirty="0"/>
+                        <a:t>20</a:t>
+                      </a:r>
+                    </a:p>
+                  </a:txBody>
+                  <a:tcPr marL="0" marR="0" marT="0" marB="0" anchor="ctr" anchorCtr="1">
+                    <a:lnL w="76200" cap="flat" cmpd="sng" algn="ctr">
+                      <a:solidFill>
+                        <a:schemeClr val="bg1"/>
+                      </a:solidFill>
+                      <a:prstDash val="solid"/>
+                      <a:round/>
+                      <a:headEnd type="none" w="med" len="med"/>
+                      <a:tailEnd type="none" w="med" len="med"/>
+                    </a:lnL>
+                    <a:lnR w="76200" cap="flat" cmpd="sng" algn="ctr">
+                      <a:solidFill>
+                        <a:schemeClr val="bg1"/>
+                      </a:solidFill>
+                      <a:prstDash val="solid"/>
+                      <a:round/>
+                      <a:headEnd type="none" w="med" len="med"/>
+                      <a:tailEnd type="none" w="med" len="med"/>
+                    </a:lnR>
+                    <a:lnT w="76200" cap="flat" cmpd="sng" algn="ctr">
+                      <a:solidFill>
+                        <a:schemeClr val="bg1"/>
+                      </a:solidFill>
+                      <a:prstDash val="solid"/>
+                      <a:round/>
+                      <a:headEnd type="none" w="med" len="med"/>
+                      <a:tailEnd type="none" w="med" len="med"/>
+                    </a:lnT>
+                    <a:lnB w="76200" cap="flat" cmpd="sng" algn="ctr">
+                      <a:solidFill>
+                        <a:schemeClr val="bg1"/>
+                      </a:solidFill>
+                      <a:prstDash val="solid"/>
+                      <a:round/>
+                      <a:headEnd type="none" w="med" len="med"/>
+                      <a:tailEnd type="none" w="med" len="med"/>
+                    </a:lnB>
+                    <a:noFill/>
+                  </a:tcPr>
+                </a:tc>
+                <a:tc>
+                  <a:txBody>
+                    <a:bodyPr/>
+                    <a:lstStyle/>
+                    <a:p>
+                      <a:pPr algn="ctr"/>
+                      <a:endParaRPr lang="en-US" dirty="0"/>
+                    </a:p>
+                  </a:txBody>
+                  <a:tcPr marL="0" marR="0" marT="0" marB="0" anchor="ctr" anchorCtr="1">
+                    <a:lnL w="76200" cap="flat" cmpd="sng" algn="ctr">
+                      <a:solidFill>
+                        <a:schemeClr val="bg1"/>
+                      </a:solidFill>
+                      <a:prstDash val="solid"/>
+                      <a:round/>
+                      <a:headEnd type="none" w="med" len="med"/>
+                      <a:tailEnd type="none" w="med" len="med"/>
+                    </a:lnL>
+                    <a:lnR w="76200" cap="flat" cmpd="sng" algn="ctr">
+                      <a:solidFill>
+                        <a:schemeClr val="bg1"/>
+                      </a:solidFill>
+                      <a:prstDash val="solid"/>
+                      <a:round/>
+                      <a:headEnd type="none" w="med" len="med"/>
+                      <a:tailEnd type="none" w="med" len="med"/>
+                    </a:lnR>
+                    <a:lnT w="76200" cap="flat" cmpd="sng" algn="ctr">
+                      <a:solidFill>
+                        <a:schemeClr val="bg1"/>
+                      </a:solidFill>
+                      <a:prstDash val="solid"/>
+                      <a:round/>
+                      <a:headEnd type="none" w="med" len="med"/>
+                      <a:tailEnd type="none" w="med" len="med"/>
+                    </a:lnT>
+                    <a:lnB w="76200" cap="flat" cmpd="sng" algn="ctr">
+                      <a:solidFill>
+                        <a:schemeClr val="bg1"/>
+                      </a:solidFill>
+                      <a:prstDash val="solid"/>
+                      <a:round/>
+                      <a:headEnd type="none" w="med" len="med"/>
+                      <a:tailEnd type="none" w="med" len="med"/>
+                    </a:lnB>
+                    <a:noFill/>
+                  </a:tcPr>
+                </a:tc>
+                <a:extLst>
+                  <a:ext uri="{0D108BD9-81ED-4DB2-BD59-A6C34878D82A}">
+                    <a16:rowId xmlns:a16="http://schemas.microsoft.com/office/drawing/2014/main" val="3029260083"/>
+                  </a:ext>
+                </a:extLst>
+              </a:tr>
+            </a:tbl>
+          </a:graphicData>
+        </a:graphic>
+      </p:graphicFrame>
+      <p:sp>
+        <p:nvSpPr>
+          <p:cNvPr id="11" name="TextBox 10">
+            <a:extLst>
+              <a:ext uri="{FF2B5EF4-FFF2-40B4-BE49-F238E27FC236}">
+                <a16:creationId xmlns:a16="http://schemas.microsoft.com/office/drawing/2014/main" id="{C3705ABF-3DFC-6618-7036-3FF9EE13848B}"/>
+              </a:ext>
+            </a:extLst>
+          </p:cNvPr>
+          <p:cNvSpPr txBox="1"/>
+          <p:nvPr/>
+        </p:nvSpPr>
+        <p:spPr>
+          <a:xfrm>
+            <a:off x="7479751" y="5269155"/>
+            <a:ext cx="756104" cy="338554"/>
+          </a:xfrm>
+          <a:prstGeom prst="rect">
+            <a:avLst/>
+          </a:prstGeom>
+          <a:noFill/>
+          <a:effectLst>
+            <a:glow rad="63500">
+              <a:schemeClr val="accent2">
+                <a:satMod val="175000"/>
+                <a:alpha val="0"/>
+              </a:schemeClr>
+            </a:glow>
+          </a:effectLst>
+        </p:spPr>
+        <p:txBody>
+          <a:bodyPr wrap="square" rtlCol="0">
+            <a:spAutoFit/>
+          </a:bodyPr>
+          <a:lstStyle>
+            <a:defPPr>
+              <a:defRPr lang="en-US"/>
+            </a:defPPr>
+            <a:lvl1pPr>
+              <a:defRPr sz="2000">
+                <a:solidFill>
+                  <a:schemeClr val="bg2"/>
+                </a:solidFill>
+              </a:defRPr>
+            </a:lvl1pPr>
+          </a:lstStyle>
+          <a:p>
+            <a:pPr fontAlgn="base"/>
+            <a:r>
+              <a:rPr lang="en-US" sz="1600" dirty="0">
+                <a:solidFill>
+                  <a:schemeClr val="tx1"/>
+                </a:solidFill>
+              </a:rPr>
+              <a:t>front</a:t>
+            </a:r>
+          </a:p>
+        </p:txBody>
+      </p:sp>
+      <p:sp>
+        <p:nvSpPr>
+          <p:cNvPr id="12" name="TextBox 11">
+            <a:extLst>
+              <a:ext uri="{FF2B5EF4-FFF2-40B4-BE49-F238E27FC236}">
+                <a16:creationId xmlns:a16="http://schemas.microsoft.com/office/drawing/2014/main" id="{1673626A-FB09-022A-0805-95B5DEAD4D48}"/>
+              </a:ext>
+            </a:extLst>
+          </p:cNvPr>
+          <p:cNvSpPr txBox="1"/>
+          <p:nvPr/>
+        </p:nvSpPr>
+        <p:spPr>
+          <a:xfrm>
+            <a:off x="9432789" y="5269155"/>
+            <a:ext cx="756104" cy="338554"/>
+          </a:xfrm>
+          <a:prstGeom prst="rect">
+            <a:avLst/>
+          </a:prstGeom>
+          <a:noFill/>
+          <a:effectLst>
+            <a:glow rad="63500">
+              <a:schemeClr val="accent2">
+                <a:satMod val="175000"/>
+                <a:alpha val="0"/>
+              </a:schemeClr>
+            </a:glow>
+          </a:effectLst>
+        </p:spPr>
+        <p:txBody>
+          <a:bodyPr wrap="square" rtlCol="0">
+            <a:spAutoFit/>
+          </a:bodyPr>
+          <a:lstStyle>
+            <a:defPPr>
+              <a:defRPr lang="en-US"/>
+            </a:defPPr>
+            <a:lvl1pPr>
+              <a:defRPr sz="2000">
+                <a:solidFill>
+                  <a:schemeClr val="bg2"/>
+                </a:solidFill>
+              </a:defRPr>
+            </a:lvl1pPr>
+          </a:lstStyle>
+          <a:p>
+            <a:pPr fontAlgn="base"/>
+            <a:r>
+              <a:rPr lang="en-US" sz="1600" dirty="0">
+                <a:solidFill>
+                  <a:schemeClr val="tx1"/>
+                </a:solidFill>
+              </a:rPr>
+              <a:t>rear</a:t>
+            </a:r>
+          </a:p>
+        </p:txBody>
+      </p:sp>
+      <p:sp>
+        <p:nvSpPr>
+          <p:cNvPr id="13" name="TextBox 12">
+            <a:extLst>
+              <a:ext uri="{FF2B5EF4-FFF2-40B4-BE49-F238E27FC236}">
+                <a16:creationId xmlns:a16="http://schemas.microsoft.com/office/drawing/2014/main" id="{31A3CBEE-F957-AC94-C04F-FB685F7EBD76}"/>
+              </a:ext>
+            </a:extLst>
+          </p:cNvPr>
+          <p:cNvSpPr txBox="1"/>
+          <p:nvPr/>
+        </p:nvSpPr>
+        <p:spPr>
+          <a:xfrm>
+            <a:off x="6389242" y="6355990"/>
+            <a:ext cx="2181018" cy="338554"/>
+          </a:xfrm>
+          <a:prstGeom prst="rect">
+            <a:avLst/>
+          </a:prstGeom>
+          <a:noFill/>
+          <a:effectLst>
+            <a:glow rad="63500">
+              <a:schemeClr val="accent2">
+                <a:satMod val="175000"/>
+                <a:alpha val="0"/>
+              </a:schemeClr>
+            </a:glow>
+          </a:effectLst>
+        </p:spPr>
+        <p:txBody>
+          <a:bodyPr wrap="square" rtlCol="0">
+            <a:spAutoFit/>
+          </a:bodyPr>
+          <a:lstStyle>
+            <a:defPPr>
+              <a:defRPr lang="en-US"/>
+            </a:defPPr>
+            <a:lvl1pPr>
+              <a:defRPr sz="2000">
+                <a:solidFill>
+                  <a:schemeClr val="bg2"/>
+                </a:solidFill>
+              </a:defRPr>
+            </a:lvl1pPr>
+          </a:lstStyle>
+          <a:p>
+            <a:pPr fontAlgn="base"/>
+            <a:r>
+              <a:rPr lang="en-US" sz="1600" b="1" dirty="0">
+                <a:solidFill>
+                  <a:schemeClr val="tx1"/>
+                </a:solidFill>
+              </a:rPr>
+              <a:t>Output</a:t>
+            </a:r>
+            <a:r>
+              <a:rPr lang="en-US" sz="1600" dirty="0">
+                <a:solidFill>
+                  <a:schemeClr val="tx1"/>
+                </a:solidFill>
+              </a:rPr>
+              <a:t>: 30, 40, 20 </a:t>
             </a:r>
           </a:p>
         </p:txBody>

</xml_diff>